<commit_message>
created an exercise for introBwaSamtools.pptx modified the exercise for SamFormatAndFiltering.pptx
</commit_message>
<xml_diff>
--- a/doc/slides/day1/session4/SamFormatAndFiltering.pptx
+++ b/doc/slides/day1/session4/SamFormatAndFiltering.pptx
@@ -200,7 +200,7 @@
             <a:fld id="{11D2843E-FABA-5647-BE09-469D1564CF94}" type="datetimeFigureOut">
               <a:rPr lang="en-US" smtClean="0"/>
               <a:pPr/>
-              <a:t>10/18/13</a:t>
+              <a:t>10/21/13</a:t>
             </a:fld>
             <a:endParaRPr lang="en-US"/>
           </a:p>
@@ -747,7 +747,7 @@
             <a:fld id="{92EB5B03-E054-B54F-97A5-9471F82931B5}" type="datetimeFigureOut">
               <a:rPr lang="en-US" smtClean="0"/>
               <a:pPr/>
-              <a:t>10/18/13</a:t>
+              <a:t>10/21/13</a:t>
             </a:fld>
             <a:endParaRPr lang="en-US"/>
           </a:p>
@@ -914,7 +914,7 @@
             <a:fld id="{92EB5B03-E054-B54F-97A5-9471F82931B5}" type="datetimeFigureOut">
               <a:rPr lang="en-US" smtClean="0"/>
               <a:pPr/>
-              <a:t>10/18/13</a:t>
+              <a:t>10/21/13</a:t>
             </a:fld>
             <a:endParaRPr lang="en-US"/>
           </a:p>
@@ -1091,7 +1091,7 @@
             <a:fld id="{92EB5B03-E054-B54F-97A5-9471F82931B5}" type="datetimeFigureOut">
               <a:rPr lang="en-US" smtClean="0"/>
               <a:pPr/>
-              <a:t>10/18/13</a:t>
+              <a:t>10/21/13</a:t>
             </a:fld>
             <a:endParaRPr lang="en-US"/>
           </a:p>
@@ -1258,7 +1258,7 @@
             <a:fld id="{92EB5B03-E054-B54F-97A5-9471F82931B5}" type="datetimeFigureOut">
               <a:rPr lang="en-US" smtClean="0"/>
               <a:pPr/>
-              <a:t>10/18/13</a:t>
+              <a:t>10/21/13</a:t>
             </a:fld>
             <a:endParaRPr lang="en-US"/>
           </a:p>
@@ -1501,7 +1501,7 @@
             <a:fld id="{92EB5B03-E054-B54F-97A5-9471F82931B5}" type="datetimeFigureOut">
               <a:rPr lang="en-US" smtClean="0"/>
               <a:pPr/>
-              <a:t>10/18/13</a:t>
+              <a:t>10/21/13</a:t>
             </a:fld>
             <a:endParaRPr lang="en-US"/>
           </a:p>
@@ -1786,7 +1786,7 @@
             <a:fld id="{92EB5B03-E054-B54F-97A5-9471F82931B5}" type="datetimeFigureOut">
               <a:rPr lang="en-US" smtClean="0"/>
               <a:pPr/>
-              <a:t>10/18/13</a:t>
+              <a:t>10/21/13</a:t>
             </a:fld>
             <a:endParaRPr lang="en-US"/>
           </a:p>
@@ -2205,7 +2205,7 @@
             <a:fld id="{92EB5B03-E054-B54F-97A5-9471F82931B5}" type="datetimeFigureOut">
               <a:rPr lang="en-US" smtClean="0"/>
               <a:pPr/>
-              <a:t>10/18/13</a:t>
+              <a:t>10/21/13</a:t>
             </a:fld>
             <a:endParaRPr lang="en-US"/>
           </a:p>
@@ -2320,7 +2320,7 @@
             <a:fld id="{92EB5B03-E054-B54F-97A5-9471F82931B5}" type="datetimeFigureOut">
               <a:rPr lang="en-US" smtClean="0"/>
               <a:pPr/>
-              <a:t>10/18/13</a:t>
+              <a:t>10/21/13</a:t>
             </a:fld>
             <a:endParaRPr lang="en-US"/>
           </a:p>
@@ -2412,7 +2412,7 @@
             <a:fld id="{92EB5B03-E054-B54F-97A5-9471F82931B5}" type="datetimeFigureOut">
               <a:rPr lang="en-US" smtClean="0"/>
               <a:pPr/>
-              <a:t>10/18/13</a:t>
+              <a:t>10/21/13</a:t>
             </a:fld>
             <a:endParaRPr lang="en-US"/>
           </a:p>
@@ -2686,7 +2686,7 @@
             <a:fld id="{92EB5B03-E054-B54F-97A5-9471F82931B5}" type="datetimeFigureOut">
               <a:rPr lang="en-US" smtClean="0"/>
               <a:pPr/>
-              <a:t>10/18/13</a:t>
+              <a:t>10/21/13</a:t>
             </a:fld>
             <a:endParaRPr lang="en-US"/>
           </a:p>
@@ -2936,7 +2936,7 @@
             <a:fld id="{92EB5B03-E054-B54F-97A5-9471F82931B5}" type="datetimeFigureOut">
               <a:rPr lang="en-US" smtClean="0"/>
               <a:pPr/>
-              <a:t>10/18/13</a:t>
+              <a:t>10/21/13</a:t>
             </a:fld>
             <a:endParaRPr lang="en-US"/>
           </a:p>
@@ -3146,7 +3146,7 @@
             <a:fld id="{92EB5B03-E054-B54F-97A5-9471F82931B5}" type="datetimeFigureOut">
               <a:rPr lang="en-US" smtClean="0"/>
               <a:pPr/>
-              <a:t>10/18/13</a:t>
+              <a:t>10/21/13</a:t>
             </a:fld>
             <a:endParaRPr lang="en-US"/>
           </a:p>
@@ -4521,14 +4521,6 @@
               <a:buFont typeface="Wingdings" charset="2"/>
               <a:buChar char="Ø"/>
             </a:pPr>
-            <a:r>
-              <a:rPr lang="en-US" dirty="0" smtClean="0"/>
-              <a:t>edit/run </a:t>
-            </a:r>
-            <a:r>
-              <a:rPr lang="en-US" dirty="0" err="1" smtClean="0"/>
-              <a:t>src/Plasmodium.sh</a:t>
-            </a:r>
             <a:endParaRPr lang="en-US" dirty="0" smtClean="0"/>
           </a:p>
           <a:p>
@@ -4542,13 +4534,8 @@
             </a:r>
             <a:r>
               <a:rPr lang="en-US" dirty="0" smtClean="0"/>
-              <a:t> </a:t>
-            </a:r>
-            <a:r>
-              <a:rPr lang="en-US" smtClean="0"/>
-              <a:t>checkout master</a:t>
-            </a:r>
-            <a:endParaRPr lang="en-US" dirty="0" smtClean="0"/>
+              <a:t> checkout master</a:t>
+            </a:r>
           </a:p>
         </p:txBody>
       </p:sp>

</xml_diff>